<commit_message>
Added anaysis UK Pillar 2 SGTF data
</commit_message>
<xml_diff>
--- a/plots/fit1_binomGLMM_VOC_Belgium.pptx
+++ b/plots/fit1_binomGLMM_VOC_Belgium.pptx
@@ -4892,8 +4892,8 @@
           </p:nvSpPr>
           <p:spPr>
             <a:xfrm>
-              <a:off x="2243310" y="5010673"/>
-              <a:ext cx="106615" cy="106615"/>
+              <a:off x="2187636" y="4811569"/>
+              <a:ext cx="91631" cy="91631"/>
             </a:xfrm>
             <a:prstGeom prst="ellipse">
               <a:avLst/>
@@ -4927,8 +4927,8 @@
           </p:nvSpPr>
           <p:spPr>
             <a:xfrm>
-              <a:off x="2307306" y="4829788"/>
-              <a:ext cx="104952" cy="104952"/>
+              <a:off x="2243292" y="5010655"/>
+              <a:ext cx="106651" cy="106651"/>
             </a:xfrm>
             <a:prstGeom prst="ellipse">
               <a:avLst/>
@@ -4962,8 +4962,8 @@
           </p:nvSpPr>
           <p:spPr>
             <a:xfrm>
-              <a:off x="2356859" y="4880357"/>
-              <a:ext cx="132175" cy="132175"/>
+              <a:off x="2306603" y="4829085"/>
+              <a:ext cx="106357" cy="106357"/>
             </a:xfrm>
             <a:prstGeom prst="ellipse">
               <a:avLst/>
@@ -4997,8 +4997,8 @@
           </p:nvSpPr>
           <p:spPr>
             <a:xfrm>
-              <a:off x="2413303" y="5112288"/>
-              <a:ext cx="145616" cy="145616"/>
+              <a:off x="2367112" y="4890610"/>
+              <a:ext cx="111669" cy="111669"/>
             </a:xfrm>
             <a:prstGeom prst="ellipse">
               <a:avLst/>
@@ -5032,8 +5032,8 @@
           </p:nvSpPr>
           <p:spPr>
             <a:xfrm>
-              <a:off x="2491998" y="4821767"/>
-              <a:ext cx="114557" cy="114557"/>
+              <a:off x="2428784" y="5127768"/>
+              <a:ext cx="114656" cy="114656"/>
             </a:xfrm>
             <a:prstGeom prst="ellipse">
               <a:avLst/>
@@ -5067,8 +5067,8 @@
           </p:nvSpPr>
           <p:spPr>
             <a:xfrm>
-              <a:off x="2555663" y="4897956"/>
-              <a:ext cx="113557" cy="113557"/>
+              <a:off x="2495221" y="4824990"/>
+              <a:ext cx="108111" cy="108111"/>
             </a:xfrm>
             <a:prstGeom prst="ellipse">
               <a:avLst/>
@@ -5102,8 +5102,8 @@
           </p:nvSpPr>
           <p:spPr>
             <a:xfrm>
-              <a:off x="2618188" y="4827830"/>
-              <a:ext cx="114837" cy="114837"/>
+              <a:off x="2558480" y="4900773"/>
+              <a:ext cx="107922" cy="107922"/>
             </a:xfrm>
             <a:prstGeom prst="ellipse">
               <a:avLst/>
@@ -5137,8 +5137,8 @@
           </p:nvSpPr>
           <p:spPr>
             <a:xfrm>
-              <a:off x="2690604" y="4509676"/>
-              <a:ext cx="96335" cy="96335"/>
+              <a:off x="2621524" y="4831166"/>
+              <a:ext cx="108164" cy="108164"/>
             </a:xfrm>
             <a:prstGeom prst="ellipse">
               <a:avLst/>
@@ -5172,8 +5172,8 @@
           </p:nvSpPr>
           <p:spPr>
             <a:xfrm>
-              <a:off x="2737695" y="4836845"/>
-              <a:ext cx="128481" cy="128481"/>
+              <a:off x="2686320" y="4505392"/>
+              <a:ext cx="104901" cy="104901"/>
             </a:xfrm>
             <a:prstGeom prst="ellipse">
               <a:avLst/>
@@ -5207,8 +5207,8 @@
           </p:nvSpPr>
           <p:spPr>
             <a:xfrm>
-              <a:off x="2799373" y="4937015"/>
-              <a:ext cx="131456" cy="131456"/>
+              <a:off x="2746492" y="4845642"/>
+              <a:ext cx="110888" cy="110888"/>
             </a:xfrm>
             <a:prstGeom prst="ellipse">
               <a:avLst/>
@@ -5242,8 +5242,8 @@
           </p:nvSpPr>
           <p:spPr>
             <a:xfrm>
-              <a:off x="2860967" y="4768046"/>
-              <a:ext cx="134597" cy="134597"/>
+              <a:off x="2809343" y="4946985"/>
+              <a:ext cx="111516" cy="111516"/>
             </a:xfrm>
             <a:prstGeom prst="ellipse">
               <a:avLst/>
@@ -5277,8 +5277,8 @@
           </p:nvSpPr>
           <p:spPr>
             <a:xfrm>
-              <a:off x="2928992" y="4806792"/>
-              <a:ext cx="124877" cy="124877"/>
+              <a:off x="2872170" y="4779249"/>
+              <a:ext cx="112191" cy="112191"/>
             </a:xfrm>
             <a:prstGeom prst="ellipse">
               <a:avLst/>
@@ -5312,8 +5312,8 @@
           </p:nvSpPr>
           <p:spPr>
             <a:xfrm>
-              <a:off x="2994730" y="4684202"/>
-              <a:ext cx="119731" cy="119731"/>
+              <a:off x="2936358" y="4814158"/>
+              <a:ext cx="110144" cy="110144"/>
             </a:xfrm>
             <a:prstGeom prst="ellipse">
               <a:avLst/>
@@ -5347,8 +5347,8 @@
           </p:nvSpPr>
           <p:spPr>
             <a:xfrm>
-              <a:off x="3061127" y="4462788"/>
-              <a:ext cx="113266" cy="113266"/>
+              <a:off x="3000039" y="4689512"/>
+              <a:ext cx="109112" cy="109112"/>
             </a:xfrm>
             <a:prstGeom prst="ellipse">
               <a:avLst/>
@@ -5382,8 +5382,8 @@
           </p:nvSpPr>
           <p:spPr>
             <a:xfrm>
-              <a:off x="3131686" y="4449828"/>
-              <a:ext cx="98478" cy="98478"/>
+              <a:off x="3063826" y="4465487"/>
+              <a:ext cx="107867" cy="107867"/>
             </a:xfrm>
             <a:prstGeom prst="ellipse">
               <a:avLst/>
@@ -5417,8 +5417,8 @@
           </p:nvSpPr>
           <p:spPr>
             <a:xfrm>
-              <a:off x="3186259" y="4503249"/>
-              <a:ext cx="115662" cy="115662"/>
+              <a:off x="3128299" y="4446440"/>
+              <a:ext cx="105252" cy="105252"/>
             </a:xfrm>
             <a:prstGeom prst="ellipse">
               <a:avLst/>
@@ -5452,8 +5452,8 @@
           </p:nvSpPr>
           <p:spPr>
             <a:xfrm>
-              <a:off x="3244867" y="4545717"/>
-              <a:ext cx="124776" cy="124776"/>
+              <a:off x="3189929" y="4506919"/>
+              <a:ext cx="108322" cy="108322"/>
             </a:xfrm>
             <a:prstGeom prst="ellipse">
               <a:avLst/>
@@ -5487,8 +5487,8 @@
           </p:nvSpPr>
           <p:spPr>
             <a:xfrm>
-              <a:off x="3314847" y="4412749"/>
-              <a:ext cx="111146" cy="111146"/>
+              <a:off x="3252193" y="4553043"/>
+              <a:ext cx="110123" cy="110123"/>
             </a:xfrm>
             <a:prstGeom prst="ellipse">
               <a:avLst/>
@@ -5522,8 +5522,8 @@
           </p:nvSpPr>
           <p:spPr>
             <a:xfrm>
-              <a:off x="3372626" y="4229371"/>
-              <a:ext cx="121916" cy="121916"/>
+              <a:off x="3316683" y="4414586"/>
+              <a:ext cx="107473" cy="107473"/>
             </a:xfrm>
             <a:prstGeom prst="ellipse">
               <a:avLst/>
@@ -5557,8 +5557,8 @@
           </p:nvSpPr>
           <p:spPr>
             <a:xfrm>
-              <a:off x="3437064" y="4210553"/>
-              <a:ext cx="119371" cy="119371"/>
+              <a:off x="3378812" y="4235556"/>
+              <a:ext cx="109546" cy="109546"/>
             </a:xfrm>
             <a:prstGeom prst="ellipse">
               <a:avLst/>
@@ -5592,8 +5592,8 @@
           </p:nvSpPr>
           <p:spPr>
             <a:xfrm>
-              <a:off x="3503355" y="4167924"/>
-              <a:ext cx="113119" cy="113119"/>
+              <a:off x="3442229" y="4215718"/>
+              <a:ext cx="109041" cy="109041"/>
             </a:xfrm>
             <a:prstGeom prst="ellipse">
               <a:avLst/>
@@ -5621,7 +5621,42 @@
         </p:sp>
         <p:sp>
           <p:nvSpPr>
-            <p:cNvPr id="37" name="tx37"/>
+            <p:cNvPr id="37" name="pt37"/>
+            <p:cNvSpPr/>
+            <p:nvPr/>
+          </p:nvSpPr>
+          <p:spPr>
+            <a:xfrm>
+              <a:off x="3505994" y="4170563"/>
+              <a:ext cx="107840" cy="107840"/>
+            </a:xfrm>
+            <a:prstGeom prst="ellipse">
+              <a:avLst/>
+            </a:prstGeom>
+            <a:solidFill>
+              <a:srgbClr val="4682B4">
+                <a:alpha val="50196"/>
+              </a:srgbClr>
+            </a:solidFill>
+            <a:ln w="9000" cap="rnd">
+              <a:solidFill>
+                <a:srgbClr val="4682B4">
+                  <a:alpha val="50196"/>
+                </a:srgbClr>
+              </a:solidFill>
+              <a:prstDash val="solid"/>
+              <a:round/>
+            </a:ln>
+          </p:spPr>
+          <p:txBody>
+            <a:bodyPr/>
+            <a:lstStyle/>
+            <a:p/>
+          </p:txBody>
+        </p:sp>
+        <p:sp>
+          <p:nvSpPr>
+            <p:cNvPr id="38" name="tx38"/>
             <p:cNvSpPr/>
             <p:nvPr/>
           </p:nvSpPr>
@@ -5667,7 +5702,7 @@
         </p:sp>
         <p:sp>
           <p:nvSpPr>
-            <p:cNvPr id="38" name="tx38"/>
+            <p:cNvPr id="39" name="tx39"/>
             <p:cNvSpPr/>
             <p:nvPr/>
           </p:nvSpPr>
@@ -5713,7 +5748,7 @@
         </p:sp>
         <p:sp>
           <p:nvSpPr>
-            <p:cNvPr id="39" name="tx39"/>
+            <p:cNvPr id="40" name="tx40"/>
             <p:cNvSpPr/>
             <p:nvPr/>
           </p:nvSpPr>
@@ -5759,7 +5794,7 @@
         </p:sp>
         <p:sp>
           <p:nvSpPr>
-            <p:cNvPr id="40" name="tx40"/>
+            <p:cNvPr id="41" name="tx41"/>
             <p:cNvSpPr/>
             <p:nvPr/>
           </p:nvSpPr>
@@ -5805,7 +5840,7 @@
         </p:sp>
         <p:sp>
           <p:nvSpPr>
-            <p:cNvPr id="41" name="tx41"/>
+            <p:cNvPr id="42" name="tx42"/>
             <p:cNvSpPr/>
             <p:nvPr/>
           </p:nvSpPr>
@@ -5851,7 +5886,7 @@
         </p:sp>
         <p:sp>
           <p:nvSpPr>
-            <p:cNvPr id="42" name="tx42"/>
+            <p:cNvPr id="43" name="tx43"/>
             <p:cNvSpPr/>
             <p:nvPr/>
           </p:nvSpPr>
@@ -5897,7 +5932,7 @@
         </p:sp>
         <p:sp>
           <p:nvSpPr>
-            <p:cNvPr id="43" name="tx43"/>
+            <p:cNvPr id="44" name="tx44"/>
             <p:cNvSpPr/>
             <p:nvPr/>
           </p:nvSpPr>
@@ -5943,7 +5978,7 @@
         </p:sp>
         <p:sp>
           <p:nvSpPr>
-            <p:cNvPr id="44" name="pl44"/>
+            <p:cNvPr id="45" name="pl45"/>
             <p:cNvSpPr/>
             <p:nvPr/>
           </p:nvSpPr>
@@ -5983,7 +6018,7 @@
         </p:sp>
         <p:sp>
           <p:nvSpPr>
-            <p:cNvPr id="45" name="pl45"/>
+            <p:cNvPr id="46" name="pl46"/>
             <p:cNvSpPr/>
             <p:nvPr/>
           </p:nvSpPr>
@@ -6023,7 +6058,7 @@
         </p:sp>
         <p:sp>
           <p:nvSpPr>
-            <p:cNvPr id="46" name="pl46"/>
+            <p:cNvPr id="47" name="pl47"/>
             <p:cNvSpPr/>
             <p:nvPr/>
           </p:nvSpPr>
@@ -6063,7 +6098,7 @@
         </p:sp>
         <p:sp>
           <p:nvSpPr>
-            <p:cNvPr id="47" name="pl47"/>
+            <p:cNvPr id="48" name="pl48"/>
             <p:cNvSpPr/>
             <p:nvPr/>
           </p:nvSpPr>
@@ -6103,7 +6138,7 @@
         </p:sp>
         <p:sp>
           <p:nvSpPr>
-            <p:cNvPr id="48" name="pl48"/>
+            <p:cNvPr id="49" name="pl49"/>
             <p:cNvSpPr/>
             <p:nvPr/>
           </p:nvSpPr>
@@ -6143,7 +6178,7 @@
         </p:sp>
         <p:sp>
           <p:nvSpPr>
-            <p:cNvPr id="49" name="pl49"/>
+            <p:cNvPr id="50" name="pl50"/>
             <p:cNvSpPr/>
             <p:nvPr/>
           </p:nvSpPr>
@@ -6183,7 +6218,7 @@
         </p:sp>
         <p:sp>
           <p:nvSpPr>
-            <p:cNvPr id="50" name="pl50"/>
+            <p:cNvPr id="51" name="pl51"/>
             <p:cNvSpPr/>
             <p:nvPr/>
           </p:nvSpPr>
@@ -6223,7 +6258,7 @@
         </p:sp>
         <p:sp>
           <p:nvSpPr>
-            <p:cNvPr id="51" name="pl51"/>
+            <p:cNvPr id="52" name="pl52"/>
             <p:cNvSpPr/>
             <p:nvPr/>
           </p:nvSpPr>
@@ -6263,7 +6298,7 @@
         </p:sp>
         <p:sp>
           <p:nvSpPr>
-            <p:cNvPr id="52" name="pl52"/>
+            <p:cNvPr id="53" name="pl53"/>
             <p:cNvSpPr/>
             <p:nvPr/>
           </p:nvSpPr>
@@ -6303,7 +6338,7 @@
         </p:sp>
         <p:sp>
           <p:nvSpPr>
-            <p:cNvPr id="53" name="pl53"/>
+            <p:cNvPr id="54" name="pl54"/>
             <p:cNvSpPr/>
             <p:nvPr/>
           </p:nvSpPr>
@@ -6343,7 +6378,7 @@
         </p:sp>
         <p:sp>
           <p:nvSpPr>
-            <p:cNvPr id="54" name="pl54"/>
+            <p:cNvPr id="55" name="pl55"/>
             <p:cNvSpPr/>
             <p:nvPr/>
           </p:nvSpPr>
@@ -6383,7 +6418,7 @@
         </p:sp>
         <p:sp>
           <p:nvSpPr>
-            <p:cNvPr id="55" name="pl55"/>
+            <p:cNvPr id="56" name="pl56"/>
             <p:cNvSpPr/>
             <p:nvPr/>
           </p:nvSpPr>
@@ -6423,7 +6458,7 @@
         </p:sp>
         <p:sp>
           <p:nvSpPr>
-            <p:cNvPr id="56" name="pl56"/>
+            <p:cNvPr id="57" name="pl57"/>
             <p:cNvSpPr/>
             <p:nvPr/>
           </p:nvSpPr>
@@ -6463,7 +6498,7 @@
         </p:sp>
         <p:sp>
           <p:nvSpPr>
-            <p:cNvPr id="57" name="tx57"/>
+            <p:cNvPr id="58" name="tx58"/>
             <p:cNvSpPr/>
             <p:nvPr/>
           </p:nvSpPr>
@@ -6509,7 +6544,7 @@
         </p:sp>
         <p:sp>
           <p:nvSpPr>
-            <p:cNvPr id="58" name="tx58"/>
+            <p:cNvPr id="59" name="tx59"/>
             <p:cNvSpPr/>
             <p:nvPr/>
           </p:nvSpPr>
@@ -6555,7 +6590,7 @@
         </p:sp>
         <p:sp>
           <p:nvSpPr>
-            <p:cNvPr id="59" name="tx59"/>
+            <p:cNvPr id="60" name="tx60"/>
             <p:cNvSpPr/>
             <p:nvPr/>
           </p:nvSpPr>
@@ -6601,7 +6636,7 @@
         </p:sp>
         <p:sp>
           <p:nvSpPr>
-            <p:cNvPr id="60" name="tx60"/>
+            <p:cNvPr id="61" name="tx61"/>
             <p:cNvSpPr/>
             <p:nvPr/>
           </p:nvSpPr>
@@ -6647,7 +6682,7 @@
         </p:sp>
         <p:sp>
           <p:nvSpPr>
-            <p:cNvPr id="61" name="tx61"/>
+            <p:cNvPr id="62" name="tx62"/>
             <p:cNvSpPr/>
             <p:nvPr/>
           </p:nvSpPr>
@@ -6693,7 +6728,7 @@
         </p:sp>
         <p:sp>
           <p:nvSpPr>
-            <p:cNvPr id="62" name="tx62"/>
+            <p:cNvPr id="63" name="tx63"/>
             <p:cNvSpPr/>
             <p:nvPr/>
           </p:nvSpPr>
@@ -6739,7 +6774,7 @@
         </p:sp>
         <p:sp>
           <p:nvSpPr>
-            <p:cNvPr id="63" name="tx63"/>
+            <p:cNvPr id="64" name="tx64"/>
             <p:cNvSpPr/>
             <p:nvPr/>
           </p:nvSpPr>
@@ -6785,7 +6820,7 @@
         </p:sp>
         <p:sp>
           <p:nvSpPr>
-            <p:cNvPr id="64" name="tx64"/>
+            <p:cNvPr id="65" name="tx65"/>
             <p:cNvSpPr/>
             <p:nvPr/>
           </p:nvSpPr>
@@ -6831,14 +6866,14 @@
         </p:sp>
         <p:sp>
           <p:nvSpPr>
-            <p:cNvPr id="65" name="rc65"/>
+            <p:cNvPr id="66" name="rc66"/>
             <p:cNvSpPr/>
             <p:nvPr/>
           </p:nvSpPr>
           <p:spPr>
             <a:xfrm>
-              <a:off x="7931139" y="2791273"/>
-              <a:ext cx="1005953" cy="1629365"/>
+              <a:off x="7931139" y="2901001"/>
+              <a:ext cx="1005953" cy="1409909"/>
             </a:xfrm>
             <a:prstGeom prst="rect">
               <a:avLst/>
@@ -6857,13 +6892,13 @@
         </p:sp>
         <p:sp>
           <p:nvSpPr>
-            <p:cNvPr id="66" name="tx66"/>
+            <p:cNvPr id="67" name="tx67"/>
             <p:cNvSpPr/>
             <p:nvPr/>
           </p:nvSpPr>
           <p:spPr>
             <a:xfrm>
-              <a:off x="8000728" y="2878870"/>
+              <a:off x="8000728" y="2988598"/>
               <a:ext cx="686172" cy="112737"/>
             </a:xfrm>
             <a:prstGeom prst="rect">
@@ -6903,13 +6938,13 @@
         </p:sp>
         <p:sp>
           <p:nvSpPr>
-            <p:cNvPr id="67" name="tx67"/>
+            <p:cNvPr id="68" name="tx68"/>
             <p:cNvSpPr/>
             <p:nvPr/>
           </p:nvSpPr>
           <p:spPr>
             <a:xfrm>
-              <a:off x="8000728" y="3016822"/>
+              <a:off x="8000728" y="3126550"/>
               <a:ext cx="880913" cy="139377"/>
             </a:xfrm>
             <a:prstGeom prst="rect">
@@ -6949,14 +6984,14 @@
         </p:sp>
         <p:sp>
           <p:nvSpPr>
-            <p:cNvPr id="68" name="rc68"/>
+            <p:cNvPr id="69" name="rc69"/>
             <p:cNvSpPr/>
             <p:nvPr/>
           </p:nvSpPr>
           <p:spPr>
             <a:xfrm>
-              <a:off x="8000728" y="3253769"/>
-              <a:ext cx="219455" cy="219456"/>
+              <a:off x="8000728" y="3363497"/>
+              <a:ext cx="219455" cy="219455"/>
             </a:xfrm>
             <a:prstGeom prst="rect">
               <a:avLst/>
@@ -6970,13 +7005,13 @@
         </p:sp>
         <p:sp>
           <p:nvSpPr>
-            <p:cNvPr id="69" name="pt69"/>
+            <p:cNvPr id="70" name="pt70"/>
             <p:cNvSpPr/>
             <p:nvPr/>
           </p:nvSpPr>
           <p:spPr>
             <a:xfrm>
-              <a:off x="8105820" y="3358861"/>
+              <a:off x="8105820" y="3468589"/>
               <a:ext cx="9271" cy="9271"/>
             </a:xfrm>
             <a:prstGeom prst="ellipse">
@@ -7005,13 +7040,13 @@
         </p:sp>
         <p:sp>
           <p:nvSpPr>
-            <p:cNvPr id="70" name="rc70"/>
+            <p:cNvPr id="71" name="rc71"/>
             <p:cNvSpPr/>
             <p:nvPr/>
           </p:nvSpPr>
           <p:spPr>
             <a:xfrm>
-              <a:off x="8000728" y="3473225"/>
+              <a:off x="8000728" y="3582953"/>
               <a:ext cx="219455" cy="219455"/>
             </a:xfrm>
             <a:prstGeom prst="rect">
@@ -7026,14 +7061,14 @@
         </p:sp>
         <p:sp>
           <p:nvSpPr>
-            <p:cNvPr id="71" name="pt71"/>
+            <p:cNvPr id="72" name="pt72"/>
             <p:cNvSpPr/>
             <p:nvPr/>
           </p:nvSpPr>
           <p:spPr>
             <a:xfrm>
-              <a:off x="8065236" y="3537733"/>
-              <a:ext cx="90439" cy="90439"/>
+              <a:off x="8074605" y="3656830"/>
+              <a:ext cx="71702" cy="71702"/>
             </a:xfrm>
             <a:prstGeom prst="ellipse">
               <a:avLst/>
@@ -7061,13 +7096,13 @@
         </p:sp>
         <p:sp>
           <p:nvSpPr>
-            <p:cNvPr id="72" name="rc72"/>
+            <p:cNvPr id="73" name="rc73"/>
             <p:cNvSpPr/>
             <p:nvPr/>
           </p:nvSpPr>
           <p:spPr>
             <a:xfrm>
-              <a:off x="8000728" y="3692681"/>
+              <a:off x="8000728" y="3802409"/>
               <a:ext cx="219455" cy="219455"/>
             </a:xfrm>
             <a:prstGeom prst="rect">
@@ -7082,14 +7117,14 @@
         </p:sp>
         <p:sp>
           <p:nvSpPr>
-            <p:cNvPr id="73" name="pt73"/>
+            <p:cNvPr id="74" name="pt74"/>
             <p:cNvSpPr/>
             <p:nvPr/>
           </p:nvSpPr>
           <p:spPr>
             <a:xfrm>
-              <a:off x="8048426" y="3740379"/>
-              <a:ext cx="124060" cy="124060"/>
+              <a:off x="8061675" y="3863356"/>
+              <a:ext cx="97562" cy="97562"/>
             </a:xfrm>
             <a:prstGeom prst="ellipse">
               <a:avLst/>
@@ -7117,14 +7152,14 @@
         </p:sp>
         <p:sp>
           <p:nvSpPr>
-            <p:cNvPr id="74" name="rc74"/>
+            <p:cNvPr id="75" name="rc75"/>
             <p:cNvSpPr/>
             <p:nvPr/>
           </p:nvSpPr>
           <p:spPr>
             <a:xfrm>
-              <a:off x="8000728" y="3912137"/>
-              <a:ext cx="219455" cy="219455"/>
+              <a:off x="8000728" y="4021865"/>
+              <a:ext cx="219455" cy="219456"/>
             </a:xfrm>
             <a:prstGeom prst="rect">
               <a:avLst/>
@@ -7138,14 +7173,14 @@
         </p:sp>
         <p:sp>
           <p:nvSpPr>
-            <p:cNvPr id="75" name="pt75"/>
+            <p:cNvPr id="76" name="pt76"/>
             <p:cNvSpPr/>
             <p:nvPr/>
           </p:nvSpPr>
           <p:spPr>
             <a:xfrm>
-              <a:off x="8035527" y="3946936"/>
-              <a:ext cx="149858" cy="149858"/>
+              <a:off x="8051753" y="4072890"/>
+              <a:ext cx="117404" cy="117404"/>
             </a:xfrm>
             <a:prstGeom prst="ellipse">
               <a:avLst/>
@@ -7173,69 +7208,105 @@
         </p:sp>
         <p:sp>
           <p:nvSpPr>
-            <p:cNvPr id="76" name="rc76"/>
+            <p:cNvPr id="77" name="tx77"/>
             <p:cNvSpPr/>
             <p:nvPr/>
           </p:nvSpPr>
           <p:spPr>
             <a:xfrm>
-              <a:off x="8000728" y="4131593"/>
-              <a:ext cx="219455" cy="219456"/>
+              <a:off x="8296099" y="3429231"/>
+              <a:ext cx="67806" cy="87630"/>
             </a:xfrm>
             <a:prstGeom prst="rect">
               <a:avLst/>
             </a:prstGeom>
-          </p:spPr>
-          <p:txBody>
-            <a:bodyPr/>
-            <a:lstStyle/>
-            <a:p/>
-          </p:txBody>
-        </p:sp>
-        <p:sp>
-          <p:nvSpPr>
-            <p:cNvPr id="77" name="pt77"/>
+            <a:noFill/>
+          </p:spPr>
+          <p:txBody>
+            <a:bodyPr lIns="0" rIns="0" tIns="0" bIns="0" anchorCtr="1" anchor="ctr" wrap="none"/>
+            <a:lstStyle/>
+            <a:p>
+              <a:pPr algn="l" marL="0" marR="0" indent="0">
+                <a:lnSpc>
+                  <a:spcPts val="960"/>
+                </a:lnSpc>
+                <a:spcBef>
+                  <a:spcPts val="0"/>
+                </a:spcBef>
+                <a:spcAft>
+                  <a:spcPts val="0"/>
+                </a:spcAft>
+              </a:pPr>
+              <a:r>
+                <a:rPr sz="960">
+                  <a:solidFill>
+                    <a:srgbClr val="000000">
+                      <a:alpha val="100000"/>
+                    </a:srgbClr>
+                  </a:solidFill>
+                  <a:latin typeface="Arial"/>
+                  <a:cs typeface="Arial"/>
+                </a:rPr>
+                <a:t>1</a:t>
+              </a:r>
+            </a:p>
+          </p:txBody>
+        </p:sp>
+        <p:sp>
+          <p:nvSpPr>
+            <p:cNvPr id="78" name="tx78"/>
             <p:cNvSpPr/>
             <p:nvPr/>
           </p:nvSpPr>
           <p:spPr>
             <a:xfrm>
-              <a:off x="8024652" y="4155517"/>
-              <a:ext cx="171607" cy="171607"/>
-            </a:xfrm>
-            <a:prstGeom prst="ellipse">
+              <a:off x="8296099" y="3647199"/>
+              <a:ext cx="135612" cy="89118"/>
+            </a:xfrm>
+            <a:prstGeom prst="rect">
               <a:avLst/>
             </a:prstGeom>
-            <a:solidFill>
-              <a:srgbClr val="4682B4">
-                <a:alpha val="50196"/>
-              </a:srgbClr>
-            </a:solidFill>
-            <a:ln w="9000" cap="rnd">
-              <a:solidFill>
-                <a:srgbClr val="4682B4">
-                  <a:alpha val="50196"/>
-                </a:srgbClr>
-              </a:solidFill>
-              <a:prstDash val="solid"/>
-              <a:round/>
-            </a:ln>
-          </p:spPr>
-          <p:txBody>
-            <a:bodyPr/>
-            <a:lstStyle/>
-            <a:p/>
-          </p:txBody>
-        </p:sp>
-        <p:sp>
-          <p:nvSpPr>
-            <p:cNvPr id="78" name="tx78"/>
+            <a:noFill/>
+          </p:spPr>
+          <p:txBody>
+            <a:bodyPr lIns="0" rIns="0" tIns="0" bIns="0" anchorCtr="1" anchor="ctr" wrap="none"/>
+            <a:lstStyle/>
+            <a:p>
+              <a:pPr algn="l" marL="0" marR="0" indent="0">
+                <a:lnSpc>
+                  <a:spcPts val="960"/>
+                </a:lnSpc>
+                <a:spcBef>
+                  <a:spcPts val="0"/>
+                </a:spcBef>
+                <a:spcAft>
+                  <a:spcPts val="0"/>
+                </a:spcAft>
+              </a:pPr>
+              <a:r>
+                <a:rPr sz="960">
+                  <a:solidFill>
+                    <a:srgbClr val="000000">
+                      <a:alpha val="100000"/>
+                    </a:srgbClr>
+                  </a:solidFill>
+                  <a:latin typeface="Arial"/>
+                  <a:cs typeface="Arial"/>
+                </a:rPr>
+                <a:t>10</a:t>
+              </a:r>
+            </a:p>
+          </p:txBody>
+        </p:sp>
+        <p:sp>
+          <p:nvSpPr>
+            <p:cNvPr id="79" name="tx79"/>
             <p:cNvSpPr/>
             <p:nvPr/>
           </p:nvSpPr>
           <p:spPr>
             <a:xfrm>
-              <a:off x="8296099" y="3318015"/>
+              <a:off x="8296099" y="3866655"/>
               <a:ext cx="203418" cy="89118"/>
             </a:xfrm>
             <a:prstGeom prst="rect">
@@ -7275,14 +7346,14 @@
         </p:sp>
         <p:sp>
           <p:nvSpPr>
-            <p:cNvPr id="79" name="tx79"/>
+            <p:cNvPr id="80" name="tx80"/>
             <p:cNvSpPr/>
             <p:nvPr/>
           </p:nvSpPr>
           <p:spPr>
             <a:xfrm>
-              <a:off x="8296099" y="3537471"/>
-              <a:ext cx="203418" cy="89118"/>
+              <a:off x="8296099" y="4086111"/>
+              <a:ext cx="271224" cy="89118"/>
             </a:xfrm>
             <a:prstGeom prst="rect">
               <a:avLst/>
@@ -7314,145 +7385,7 @@
                   <a:latin typeface="Arial"/>
                   <a:cs typeface="Arial"/>
                 </a:rPr>
-                <a:t>200</a:t>
-              </a:r>
-            </a:p>
-          </p:txBody>
-        </p:sp>
-        <p:sp>
-          <p:nvSpPr>
-            <p:cNvPr id="80" name="tx80"/>
-            <p:cNvSpPr/>
-            <p:nvPr/>
-          </p:nvSpPr>
-          <p:spPr>
-            <a:xfrm>
-              <a:off x="8296099" y="3756927"/>
-              <a:ext cx="203418" cy="89118"/>
-            </a:xfrm>
-            <a:prstGeom prst="rect">
-              <a:avLst/>
-            </a:prstGeom>
-            <a:noFill/>
-          </p:spPr>
-          <p:txBody>
-            <a:bodyPr lIns="0" rIns="0" tIns="0" bIns="0" anchorCtr="1" anchor="ctr" wrap="none"/>
-            <a:lstStyle/>
-            <a:p>
-              <a:pPr algn="l" marL="0" marR="0" indent="0">
-                <a:lnSpc>
-                  <a:spcPts val="960"/>
-                </a:lnSpc>
-                <a:spcBef>
-                  <a:spcPts val="0"/>
-                </a:spcBef>
-                <a:spcAft>
-                  <a:spcPts val="0"/>
-                </a:spcAft>
-              </a:pPr>
-              <a:r>
-                <a:rPr sz="960">
-                  <a:solidFill>
-                    <a:srgbClr val="000000">
-                      <a:alpha val="100000"/>
-                    </a:srgbClr>
-                  </a:solidFill>
-                  <a:latin typeface="Arial"/>
-                  <a:cs typeface="Arial"/>
-                </a:rPr>
-                <a:t>400</a:t>
-              </a:r>
-            </a:p>
-          </p:txBody>
-        </p:sp>
-        <p:sp>
-          <p:nvSpPr>
-            <p:cNvPr id="81" name="tx81"/>
-            <p:cNvSpPr/>
-            <p:nvPr/>
-          </p:nvSpPr>
-          <p:spPr>
-            <a:xfrm>
-              <a:off x="8296099" y="3976383"/>
-              <a:ext cx="203418" cy="89118"/>
-            </a:xfrm>
-            <a:prstGeom prst="rect">
-              <a:avLst/>
-            </a:prstGeom>
-            <a:noFill/>
-          </p:spPr>
-          <p:txBody>
-            <a:bodyPr lIns="0" rIns="0" tIns="0" bIns="0" anchorCtr="1" anchor="ctr" wrap="none"/>
-            <a:lstStyle/>
-            <a:p>
-              <a:pPr algn="l" marL="0" marR="0" indent="0">
-                <a:lnSpc>
-                  <a:spcPts val="960"/>
-                </a:lnSpc>
-                <a:spcBef>
-                  <a:spcPts val="0"/>
-                </a:spcBef>
-                <a:spcAft>
-                  <a:spcPts val="0"/>
-                </a:spcAft>
-              </a:pPr>
-              <a:r>
-                <a:rPr sz="960">
-                  <a:solidFill>
-                    <a:srgbClr val="000000">
-                      <a:alpha val="100000"/>
-                    </a:srgbClr>
-                  </a:solidFill>
-                  <a:latin typeface="Arial"/>
-                  <a:cs typeface="Arial"/>
-                </a:rPr>
-                <a:t>800</a:t>
-              </a:r>
-            </a:p>
-          </p:txBody>
-        </p:sp>
-        <p:sp>
-          <p:nvSpPr>
-            <p:cNvPr id="82" name="tx82"/>
-            <p:cNvSpPr/>
-            <p:nvPr/>
-          </p:nvSpPr>
-          <p:spPr>
-            <a:xfrm>
-              <a:off x="8296099" y="4195839"/>
-              <a:ext cx="271224" cy="89118"/>
-            </a:xfrm>
-            <a:prstGeom prst="rect">
-              <a:avLst/>
-            </a:prstGeom>
-            <a:noFill/>
-          </p:spPr>
-          <p:txBody>
-            <a:bodyPr lIns="0" rIns="0" tIns="0" bIns="0" anchorCtr="1" anchor="ctr" wrap="none"/>
-            <a:lstStyle/>
-            <a:p>
-              <a:pPr algn="l" marL="0" marR="0" indent="0">
-                <a:lnSpc>
-                  <a:spcPts val="960"/>
-                </a:lnSpc>
-                <a:spcBef>
-                  <a:spcPts val="0"/>
-                </a:spcBef>
-                <a:spcAft>
-                  <a:spcPts val="0"/>
-                </a:spcAft>
-              </a:pPr>
-              <a:r>
-                <a:rPr sz="960">
-                  <a:solidFill>
-                    <a:srgbClr val="000000">
-                      <a:alpha val="100000"/>
-                    </a:srgbClr>
-                  </a:solidFill>
-                  <a:latin typeface="Arial"/>
-                  <a:cs typeface="Arial"/>
-                </a:rPr>
-                <a:t>1600</a:t>
+                <a:t>1000</a:t>
               </a:r>
             </a:p>
           </p:txBody>

</xml_diff>